<commit_message>
Updates to patient parameters table.
</commit_message>
<xml_diff>
--- a/docs/Figures/PatientWorking.pptx
+++ b/docs/Figures/PatientWorking.pptx
@@ -209,7 +209,7 @@
           <a:p>
             <a:fld id="{7B126BB8-5932-4ACC-8CD5-328D9DA138C9}" type="datetimeFigureOut">
               <a:rPr lang="en-US" smtClean="0"/>
-              <a:t>1/6/2020</a:t>
+              <a:t>3/27/2023</a:t>
             </a:fld>
             <a:endParaRPr lang="en-US"/>
           </a:p>
@@ -655,7 +655,7 @@
           <a:p>
             <a:fld id="{9E9AFD63-10BD-4598-9E1E-9FFECB76D2D7}" type="datetimeFigureOut">
               <a:rPr lang="en-US" smtClean="0"/>
-              <a:t>1/6/2020</a:t>
+              <a:t>3/27/2023</a:t>
             </a:fld>
             <a:endParaRPr lang="en-US"/>
           </a:p>
@@ -823,7 +823,7 @@
           <a:p>
             <a:fld id="{9E9AFD63-10BD-4598-9E1E-9FFECB76D2D7}" type="datetimeFigureOut">
               <a:rPr lang="en-US" smtClean="0"/>
-              <a:t>1/6/2020</a:t>
+              <a:t>3/27/2023</a:t>
             </a:fld>
             <a:endParaRPr lang="en-US"/>
           </a:p>
@@ -1001,7 +1001,7 @@
           <a:p>
             <a:fld id="{9E9AFD63-10BD-4598-9E1E-9FFECB76D2D7}" type="datetimeFigureOut">
               <a:rPr lang="en-US" smtClean="0"/>
-              <a:t>1/6/2020</a:t>
+              <a:t>3/27/2023</a:t>
             </a:fld>
             <a:endParaRPr lang="en-US"/>
           </a:p>
@@ -2756,7 +2756,7 @@
           <a:p>
             <a:fld id="{9E9AFD63-10BD-4598-9E1E-9FFECB76D2D7}" type="datetimeFigureOut">
               <a:rPr lang="en-US" smtClean="0"/>
-              <a:t>1/6/2020</a:t>
+              <a:t>3/27/2023</a:t>
             </a:fld>
             <a:endParaRPr lang="en-US"/>
           </a:p>
@@ -3200,7 +3200,7 @@
           <a:p>
             <a:fld id="{9E9AFD63-10BD-4598-9E1E-9FFECB76D2D7}" type="datetimeFigureOut">
               <a:rPr lang="en-US" smtClean="0"/>
-              <a:t>1/6/2020</a:t>
+              <a:t>3/27/2023</a:t>
             </a:fld>
             <a:endParaRPr lang="en-US"/>
           </a:p>
@@ -3485,7 +3485,7 @@
           <a:p>
             <a:fld id="{9E9AFD63-10BD-4598-9E1E-9FFECB76D2D7}" type="datetimeFigureOut">
               <a:rPr lang="en-US" smtClean="0"/>
-              <a:t>1/6/2020</a:t>
+              <a:t>3/27/2023</a:t>
             </a:fld>
             <a:endParaRPr lang="en-US"/>
           </a:p>
@@ -3904,7 +3904,7 @@
           <a:p>
             <a:fld id="{9E9AFD63-10BD-4598-9E1E-9FFECB76D2D7}" type="datetimeFigureOut">
               <a:rPr lang="en-US" smtClean="0"/>
-              <a:t>1/6/2020</a:t>
+              <a:t>3/27/2023</a:t>
             </a:fld>
             <a:endParaRPr lang="en-US"/>
           </a:p>
@@ -4021,7 +4021,7 @@
           <a:p>
             <a:fld id="{9E9AFD63-10BD-4598-9E1E-9FFECB76D2D7}" type="datetimeFigureOut">
               <a:rPr lang="en-US" smtClean="0"/>
-              <a:t>1/6/2020</a:t>
+              <a:t>3/27/2023</a:t>
             </a:fld>
             <a:endParaRPr lang="en-US"/>
           </a:p>
@@ -4116,7 +4116,7 @@
           <a:p>
             <a:fld id="{9E9AFD63-10BD-4598-9E1E-9FFECB76D2D7}" type="datetimeFigureOut">
               <a:rPr lang="en-US" smtClean="0"/>
-              <a:t>1/6/2020</a:t>
+              <a:t>3/27/2023</a:t>
             </a:fld>
             <a:endParaRPr lang="en-US"/>
           </a:p>
@@ -4391,7 +4391,7 @@
           <a:p>
             <a:fld id="{9E9AFD63-10BD-4598-9E1E-9FFECB76D2D7}" type="datetimeFigureOut">
               <a:rPr lang="en-US" smtClean="0"/>
-              <a:t>1/6/2020</a:t>
+              <a:t>3/27/2023</a:t>
             </a:fld>
             <a:endParaRPr lang="en-US"/>
           </a:p>
@@ -4643,7 +4643,7 @@
           <a:p>
             <a:fld id="{9E9AFD63-10BD-4598-9E1E-9FFECB76D2D7}" type="datetimeFigureOut">
               <a:rPr lang="en-US" smtClean="0"/>
-              <a:t>1/6/2020</a:t>
+              <a:t>3/27/2023</a:t>
             </a:fld>
             <a:endParaRPr lang="en-US"/>
           </a:p>
@@ -4854,7 +4854,7 @@
           <a:p>
             <a:fld id="{9E9AFD63-10BD-4598-9E1E-9FFECB76D2D7}" type="datetimeFigureOut">
               <a:rPr lang="en-US" smtClean="0"/>
-              <a:t>1/6/2020</a:t>
+              <a:t>3/27/2023</a:t>
             </a:fld>
             <a:endParaRPr lang="en-US"/>
           </a:p>
@@ -6021,25 +6021,25 @@
           <p:nvPr>
             <p:extLst>
               <p:ext uri="{D42A27DB-BD31-4B8C-83A1-F6EECF244321}">
-                <p14:modId xmlns:p14="http://schemas.microsoft.com/office/powerpoint/2010/main" val="2924718860"/>
+                <p14:modId xmlns:p14="http://schemas.microsoft.com/office/powerpoint/2010/main" val="3096570638"/>
               </p:ext>
             </p:extLst>
           </p:nvPr>
         </p:nvGraphicFramePr>
         <p:xfrm>
-          <a:off x="457200" y="-238125"/>
-          <a:ext cx="6591300" cy="12820650"/>
+          <a:off x="457200" y="-581025"/>
+          <a:ext cx="6591300" cy="13506450"/>
         </p:xfrm>
         <a:graphic>
           <a:graphicData uri="http://schemas.openxmlformats.org/presentationml/2006/ole">
             <mc:AlternateContent xmlns:mc="http://schemas.openxmlformats.org/markup-compatibility/2006">
               <mc:Choice xmlns:v="urn:schemas-microsoft-com:vml" Requires="v">
-                <p:oleObj spid="_x0000_s1046" name="Equation" r:id="rId3" imgW="4394160" imgH="8546760" progId="Equation.DSMT4">
+                <p:oleObj name="Equation" r:id="rId2" imgW="4394160" imgH="9003960" progId="Equation.DSMT4">
                   <p:embed/>
                 </p:oleObj>
               </mc:Choice>
               <mc:Fallback>
-                <p:oleObj name="Equation" r:id="rId3" imgW="4394160" imgH="8546760" progId="Equation.DSMT4">
+                <p:oleObj name="Equation" r:id="rId2" imgW="4394160" imgH="9003960" progId="Equation.DSMT4">
                   <p:embed/>
                   <p:pic>
                     <p:nvPicPr>
@@ -6050,7 +6050,7 @@
                       <p:nvPr/>
                     </p:nvPicPr>
                     <p:blipFill>
-                      <a:blip r:embed="rId4"/>
+                      <a:blip r:embed="rId3"/>
                       <a:srcRect/>
                       <a:stretch>
                         <a:fillRect/>
@@ -6058,8 +6058,8 @@
                     </p:blipFill>
                     <p:spPr bwMode="auto">
                       <a:xfrm>
-                        <a:off x="457200" y="-238125"/>
-                        <a:ext cx="6591300" cy="12820650"/>
+                        <a:off x="457200" y="-581025"/>
+                        <a:ext cx="6591300" cy="13506450"/>
                       </a:xfrm>
                       <a:prstGeom prst="rect">
                         <a:avLst/>

</xml_diff>